<commit_message>
Update vacuum level and cooling plate description.
</commit_message>
<xml_diff>
--- a/fig/Overview.pptx
+++ b/fig/Overview.pptx
@@ -115,7 +115,7 @@
 <file path=ppt/revisionInfo.xml><?xml version="1.0" encoding="utf-8"?>
 <p1510:revInfo xmlns:a="http://schemas.openxmlformats.org/drawingml/2006/main" xmlns:r="http://schemas.openxmlformats.org/officeDocument/2006/relationships" xmlns:p1510="http://schemas.microsoft.com/office/powerpoint/2015/10/main">
   <p1510:revLst>
-    <p1510:client id="{22A1A70B-2FAB-44C9-9F8F-ADEC70ED84E9}" v="30" dt="2024-12-27T05:38:22.078"/>
+    <p1510:client id="{EEC4806E-16E5-419F-A69A-07383B7A6ECF}" v="2" dt="2025-12-10T05:56:54.215"/>
   </p1510:revLst>
 </p1510:revInfo>
 </file>
@@ -123,637 +123,27 @@
 <file path=ppt/changesInfos/changesInfo1.xml><?xml version="1.0" encoding="utf-8"?>
 <pc:chgInfo xmlns:a="http://schemas.openxmlformats.org/drawingml/2006/main" xmlns:r="http://schemas.openxmlformats.org/officeDocument/2006/relationships" xmlns:ac="http://schemas.microsoft.com/office/drawing/2013/main/command" xmlns:pc="http://schemas.microsoft.com/office/powerpoint/2013/main/command">
   <pc:docChgLst>
-    <pc:chgData name="UCHIYAMA Yuusuke" userId="758e3d5f-3bbb-4028-bd3a-66c5ef996226" providerId="ADAL" clId="{22A1A70B-2FAB-44C9-9F8F-ADEC70ED84E9}"/>
-    <pc:docChg chg="undo custSel modSld modMainMaster">
-      <pc:chgData name="UCHIYAMA Yuusuke" userId="758e3d5f-3bbb-4028-bd3a-66c5ef996226" providerId="ADAL" clId="{22A1A70B-2FAB-44C9-9F8F-ADEC70ED84E9}" dt="2024-12-27T05:55:53.746" v="557" actId="20577"/>
+    <pc:chgData name="UCHIYAMA Yuusuke" userId="758e3d5f-3bbb-4028-bd3a-66c5ef996226" providerId="ADAL" clId="{8DA8F7F8-1A63-4483-BCFA-22CC77006ABC}"/>
+    <pc:docChg chg="modSld">
+      <pc:chgData name="UCHIYAMA Yuusuke" userId="758e3d5f-3bbb-4028-bd3a-66c5ef996226" providerId="ADAL" clId="{8DA8F7F8-1A63-4483-BCFA-22CC77006ABC}" dt="2025-12-10T05:56:54.215" v="1" actId="20577"/>
       <pc:docMkLst>
         <pc:docMk/>
       </pc:docMkLst>
-      <pc:sldChg chg="addSp delSp modSp mod">
-        <pc:chgData name="UCHIYAMA Yuusuke" userId="758e3d5f-3bbb-4028-bd3a-66c5ef996226" providerId="ADAL" clId="{22A1A70B-2FAB-44C9-9F8F-ADEC70ED84E9}" dt="2024-12-27T05:55:53.746" v="557" actId="20577"/>
+      <pc:sldChg chg="modSp">
+        <pc:chgData name="UCHIYAMA Yuusuke" userId="758e3d5f-3bbb-4028-bd3a-66c5ef996226" providerId="ADAL" clId="{8DA8F7F8-1A63-4483-BCFA-22CC77006ABC}" dt="2025-12-10T05:56:54.215" v="1" actId="20577"/>
         <pc:sldMkLst>
           <pc:docMk/>
           <pc:sldMk cId="1699194054" sldId="256"/>
         </pc:sldMkLst>
-        <pc:spChg chg="del mod topLvl">
-          <ac:chgData name="UCHIYAMA Yuusuke" userId="758e3d5f-3bbb-4028-bd3a-66c5ef996226" providerId="ADAL" clId="{22A1A70B-2FAB-44C9-9F8F-ADEC70ED84E9}" dt="2024-12-27T05:12:29.911" v="4" actId="21"/>
-          <ac:spMkLst>
-            <pc:docMk/>
-            <pc:sldMk cId="1699194054" sldId="256"/>
-            <ac:spMk id="3" creationId="{E99CF408-9BC5-8DFC-E02B-F6C79AC46DC2}"/>
-          </ac:spMkLst>
-        </pc:spChg>
-        <pc:spChg chg="del mod topLvl">
-          <ac:chgData name="UCHIYAMA Yuusuke" userId="758e3d5f-3bbb-4028-bd3a-66c5ef996226" providerId="ADAL" clId="{22A1A70B-2FAB-44C9-9F8F-ADEC70ED84E9}" dt="2024-12-27T05:12:18.917" v="1" actId="21"/>
-          <ac:spMkLst>
-            <pc:docMk/>
-            <pc:sldMk cId="1699194054" sldId="256"/>
-            <ac:spMk id="5" creationId="{DFABD773-670A-07F1-E8CF-55FB1017AB66}"/>
-          </ac:spMkLst>
-        </pc:spChg>
-        <pc:spChg chg="del mod topLvl">
-          <ac:chgData name="UCHIYAMA Yuusuke" userId="758e3d5f-3bbb-4028-bd3a-66c5ef996226" providerId="ADAL" clId="{22A1A70B-2FAB-44C9-9F8F-ADEC70ED84E9}" dt="2024-12-27T05:12:18.917" v="1" actId="21"/>
-          <ac:spMkLst>
-            <pc:docMk/>
-            <pc:sldMk cId="1699194054" sldId="256"/>
-            <ac:spMk id="7" creationId="{C8422762-7163-612E-1639-E6B15287EC6D}"/>
-          </ac:spMkLst>
-        </pc:spChg>
-        <pc:spChg chg="del mod topLvl">
-          <ac:chgData name="UCHIYAMA Yuusuke" userId="758e3d5f-3bbb-4028-bd3a-66c5ef996226" providerId="ADAL" clId="{22A1A70B-2FAB-44C9-9F8F-ADEC70ED84E9}" dt="2024-12-27T05:12:18.917" v="1" actId="21"/>
-          <ac:spMkLst>
-            <pc:docMk/>
-            <pc:sldMk cId="1699194054" sldId="256"/>
-            <ac:spMk id="8" creationId="{767F2997-F6D9-B6C7-97D1-4C207558648E}"/>
-          </ac:spMkLst>
-        </pc:spChg>
-        <pc:spChg chg="del mod topLvl">
-          <ac:chgData name="UCHIYAMA Yuusuke" userId="758e3d5f-3bbb-4028-bd3a-66c5ef996226" providerId="ADAL" clId="{22A1A70B-2FAB-44C9-9F8F-ADEC70ED84E9}" dt="2024-12-27T05:14:13.632" v="18" actId="21"/>
-          <ac:spMkLst>
-            <pc:docMk/>
-            <pc:sldMk cId="1699194054" sldId="256"/>
-            <ac:spMk id="11" creationId="{8B0D92C7-D504-9501-7214-9AA4329E35DE}"/>
-          </ac:spMkLst>
-        </pc:spChg>
-        <pc:spChg chg="del mod topLvl">
-          <ac:chgData name="UCHIYAMA Yuusuke" userId="758e3d5f-3bbb-4028-bd3a-66c5ef996226" providerId="ADAL" clId="{22A1A70B-2FAB-44C9-9F8F-ADEC70ED84E9}" dt="2024-12-27T05:14:10.874" v="17" actId="21"/>
-          <ac:spMkLst>
-            <pc:docMk/>
-            <pc:sldMk cId="1699194054" sldId="256"/>
-            <ac:spMk id="12" creationId="{6FFD9AF7-39D9-53C0-7A4C-CBC434C9A76F}"/>
-          </ac:spMkLst>
-        </pc:spChg>
-        <pc:spChg chg="del mod topLvl">
-          <ac:chgData name="UCHIYAMA Yuusuke" userId="758e3d5f-3bbb-4028-bd3a-66c5ef996226" providerId="ADAL" clId="{22A1A70B-2FAB-44C9-9F8F-ADEC70ED84E9}" dt="2024-12-27T05:12:18.917" v="1" actId="21"/>
-          <ac:spMkLst>
-            <pc:docMk/>
-            <pc:sldMk cId="1699194054" sldId="256"/>
-            <ac:spMk id="13" creationId="{B43064FB-F310-E6CB-75C3-E1695BEF8733}"/>
-          </ac:spMkLst>
-        </pc:spChg>
-        <pc:spChg chg="del mod topLvl">
-          <ac:chgData name="UCHIYAMA Yuusuke" userId="758e3d5f-3bbb-4028-bd3a-66c5ef996226" providerId="ADAL" clId="{22A1A70B-2FAB-44C9-9F8F-ADEC70ED84E9}" dt="2024-12-27T05:12:18.917" v="1" actId="21"/>
-          <ac:spMkLst>
-            <pc:docMk/>
-            <pc:sldMk cId="1699194054" sldId="256"/>
-            <ac:spMk id="14" creationId="{299D802D-25B3-2CDD-ADAF-E55480183F88}"/>
-          </ac:spMkLst>
-        </pc:spChg>
-        <pc:spChg chg="del mod topLvl">
-          <ac:chgData name="UCHIYAMA Yuusuke" userId="758e3d5f-3bbb-4028-bd3a-66c5ef996226" providerId="ADAL" clId="{22A1A70B-2FAB-44C9-9F8F-ADEC70ED84E9}" dt="2024-12-27T05:12:18.917" v="1" actId="21"/>
-          <ac:spMkLst>
-            <pc:docMk/>
-            <pc:sldMk cId="1699194054" sldId="256"/>
-            <ac:spMk id="16" creationId="{7AD38C91-4154-A548-B948-7C3DCB9301F1}"/>
-          </ac:spMkLst>
-        </pc:spChg>
-        <pc:spChg chg="del mod topLvl">
-          <ac:chgData name="UCHIYAMA Yuusuke" userId="758e3d5f-3bbb-4028-bd3a-66c5ef996226" providerId="ADAL" clId="{22A1A70B-2FAB-44C9-9F8F-ADEC70ED84E9}" dt="2024-12-27T05:12:18.917" v="1" actId="21"/>
-          <ac:spMkLst>
-            <pc:docMk/>
-            <pc:sldMk cId="1699194054" sldId="256"/>
-            <ac:spMk id="17" creationId="{5676D072-D4C0-918D-C1DB-24815868B61C}"/>
-          </ac:spMkLst>
-        </pc:spChg>
-        <pc:spChg chg="del mod topLvl">
-          <ac:chgData name="UCHIYAMA Yuusuke" userId="758e3d5f-3bbb-4028-bd3a-66c5ef996226" providerId="ADAL" clId="{22A1A70B-2FAB-44C9-9F8F-ADEC70ED84E9}" dt="2024-12-27T05:14:08.277" v="16" actId="21"/>
-          <ac:spMkLst>
-            <pc:docMk/>
-            <pc:sldMk cId="1699194054" sldId="256"/>
-            <ac:spMk id="20" creationId="{C9D7C714-6063-89E8-E4AE-888B6A4C1184}"/>
-          </ac:spMkLst>
-        </pc:spChg>
-        <pc:spChg chg="del mod topLvl">
-          <ac:chgData name="UCHIYAMA Yuusuke" userId="758e3d5f-3bbb-4028-bd3a-66c5ef996226" providerId="ADAL" clId="{22A1A70B-2FAB-44C9-9F8F-ADEC70ED84E9}" dt="2024-12-27T05:20:39.432" v="124" actId="21"/>
-          <ac:spMkLst>
-            <pc:docMk/>
-            <pc:sldMk cId="1699194054" sldId="256"/>
-            <ac:spMk id="21" creationId="{22427205-ACE7-16A8-2D60-E4584AFE1A9E}"/>
-          </ac:spMkLst>
-        </pc:spChg>
-        <pc:spChg chg="del mod topLvl">
-          <ac:chgData name="UCHIYAMA Yuusuke" userId="758e3d5f-3bbb-4028-bd3a-66c5ef996226" providerId="ADAL" clId="{22A1A70B-2FAB-44C9-9F8F-ADEC70ED84E9}" dt="2024-12-27T05:18:48.969" v="37" actId="21"/>
-          <ac:spMkLst>
-            <pc:docMk/>
-            <pc:sldMk cId="1699194054" sldId="256"/>
-            <ac:spMk id="22" creationId="{A8381D4E-DA3F-015F-038B-207F348513D8}"/>
-          </ac:spMkLst>
-        </pc:spChg>
-        <pc:spChg chg="mod topLvl">
-          <ac:chgData name="UCHIYAMA Yuusuke" userId="758e3d5f-3bbb-4028-bd3a-66c5ef996226" providerId="ADAL" clId="{22A1A70B-2FAB-44C9-9F8F-ADEC70ED84E9}" dt="2024-12-27T05:38:14.272" v="537"/>
-          <ac:spMkLst>
-            <pc:docMk/>
-            <pc:sldMk cId="1699194054" sldId="256"/>
-            <ac:spMk id="24" creationId="{26163E41-AA1F-742C-094C-C08F135815D0}"/>
-          </ac:spMkLst>
-        </pc:spChg>
-        <pc:spChg chg="mod topLvl">
-          <ac:chgData name="UCHIYAMA Yuusuke" userId="758e3d5f-3bbb-4028-bd3a-66c5ef996226" providerId="ADAL" clId="{22A1A70B-2FAB-44C9-9F8F-ADEC70ED84E9}" dt="2024-12-27T05:39:58.574" v="551" actId="1076"/>
-          <ac:spMkLst>
-            <pc:docMk/>
-            <pc:sldMk cId="1699194054" sldId="256"/>
-            <ac:spMk id="25" creationId="{6B1E8ED6-34CF-B238-18BF-CE6FA5064FA6}"/>
-          </ac:spMkLst>
-        </pc:spChg>
-        <pc:spChg chg="mod topLvl">
-          <ac:chgData name="UCHIYAMA Yuusuke" userId="758e3d5f-3bbb-4028-bd3a-66c5ef996226" providerId="ADAL" clId="{22A1A70B-2FAB-44C9-9F8F-ADEC70ED84E9}" dt="2024-12-27T05:38:31.983" v="538" actId="1076"/>
-          <ac:spMkLst>
-            <pc:docMk/>
-            <pc:sldMk cId="1699194054" sldId="256"/>
-            <ac:spMk id="28" creationId="{4346A8FD-7A80-5BFC-FEAD-5D64C3BF450F}"/>
-          </ac:spMkLst>
-        </pc:spChg>
-        <pc:spChg chg="del mod topLvl">
-          <ac:chgData name="UCHIYAMA Yuusuke" userId="758e3d5f-3bbb-4028-bd3a-66c5ef996226" providerId="ADAL" clId="{22A1A70B-2FAB-44C9-9F8F-ADEC70ED84E9}" dt="2024-12-27T05:12:18.917" v="1" actId="21"/>
-          <ac:spMkLst>
-            <pc:docMk/>
-            <pc:sldMk cId="1699194054" sldId="256"/>
-            <ac:spMk id="29" creationId="{06510784-3AD5-EE2E-96CD-4747F85269A4}"/>
-          </ac:spMkLst>
-        </pc:spChg>
-        <pc:spChg chg="del mod topLvl">
-          <ac:chgData name="UCHIYAMA Yuusuke" userId="758e3d5f-3bbb-4028-bd3a-66c5ef996226" providerId="ADAL" clId="{22A1A70B-2FAB-44C9-9F8F-ADEC70ED84E9}" dt="2024-12-27T05:12:18.917" v="1" actId="21"/>
-          <ac:spMkLst>
-            <pc:docMk/>
-            <pc:sldMk cId="1699194054" sldId="256"/>
-            <ac:spMk id="30" creationId="{B8AB7FA0-BFD2-2A7D-8690-0A9A0C992123}"/>
-          </ac:spMkLst>
-        </pc:spChg>
-        <pc:spChg chg="add mod">
-          <ac:chgData name="UCHIYAMA Yuusuke" userId="758e3d5f-3bbb-4028-bd3a-66c5ef996226" providerId="ADAL" clId="{22A1A70B-2FAB-44C9-9F8F-ADEC70ED84E9}" dt="2024-12-27T05:38:31.983" v="538" actId="1076"/>
-          <ac:spMkLst>
-            <pc:docMk/>
-            <pc:sldMk cId="1699194054" sldId="256"/>
-            <ac:spMk id="41" creationId="{A6CDCF6F-4BD4-084B-7E1A-AE08F75A13B7}"/>
-          </ac:spMkLst>
-        </pc:spChg>
-        <pc:spChg chg="add del mod">
-          <ac:chgData name="UCHIYAMA Yuusuke" userId="758e3d5f-3bbb-4028-bd3a-66c5ef996226" providerId="ADAL" clId="{22A1A70B-2FAB-44C9-9F8F-ADEC70ED84E9}" dt="2024-12-27T05:39:44.820" v="549" actId="1076"/>
+        <pc:spChg chg="mod">
+          <ac:chgData name="UCHIYAMA Yuusuke" userId="758e3d5f-3bbb-4028-bd3a-66c5ef996226" providerId="ADAL" clId="{8DA8F7F8-1A63-4483-BCFA-22CC77006ABC}" dt="2025-12-10T05:56:54.215" v="1" actId="20577"/>
           <ac:spMkLst>
             <pc:docMk/>
             <pc:sldMk cId="1699194054" sldId="256"/>
             <ac:spMk id="44" creationId="{831D3A19-029D-EA3F-518E-EE22DDF131E7}"/>
           </ac:spMkLst>
         </pc:spChg>
-        <pc:spChg chg="add mod">
-          <ac:chgData name="UCHIYAMA Yuusuke" userId="758e3d5f-3bbb-4028-bd3a-66c5ef996226" providerId="ADAL" clId="{22A1A70B-2FAB-44C9-9F8F-ADEC70ED84E9}" dt="2024-12-27T05:38:14.272" v="537"/>
-          <ac:spMkLst>
-            <pc:docMk/>
-            <pc:sldMk cId="1699194054" sldId="256"/>
-            <ac:spMk id="51" creationId="{90C30F78-E962-80C3-7A2D-5E5520B817CC}"/>
-          </ac:spMkLst>
-        </pc:spChg>
-        <pc:spChg chg="add mod">
-          <ac:chgData name="UCHIYAMA Yuusuke" userId="758e3d5f-3bbb-4028-bd3a-66c5ef996226" providerId="ADAL" clId="{22A1A70B-2FAB-44C9-9F8F-ADEC70ED84E9}" dt="2024-12-27T05:38:31.983" v="538" actId="1076"/>
-          <ac:spMkLst>
-            <pc:docMk/>
-            <pc:sldMk cId="1699194054" sldId="256"/>
-            <ac:spMk id="53" creationId="{3513569A-AB11-6304-466C-5E62D276D17E}"/>
-          </ac:spMkLst>
-        </pc:spChg>
-        <pc:spChg chg="add mod ord">
-          <ac:chgData name="UCHIYAMA Yuusuke" userId="758e3d5f-3bbb-4028-bd3a-66c5ef996226" providerId="ADAL" clId="{22A1A70B-2FAB-44C9-9F8F-ADEC70ED84E9}" dt="2024-12-27T05:38:31.983" v="538" actId="1076"/>
-          <ac:spMkLst>
-            <pc:docMk/>
-            <pc:sldMk cId="1699194054" sldId="256"/>
-            <ac:spMk id="60" creationId="{8D0E2EA5-A404-2888-F1AB-FB5CAA8FBD43}"/>
-          </ac:spMkLst>
-        </pc:spChg>
-        <pc:spChg chg="add mod">
-          <ac:chgData name="UCHIYAMA Yuusuke" userId="758e3d5f-3bbb-4028-bd3a-66c5ef996226" providerId="ADAL" clId="{22A1A70B-2FAB-44C9-9F8F-ADEC70ED84E9}" dt="2024-12-27T05:38:14.272" v="537"/>
-          <ac:spMkLst>
-            <pc:docMk/>
-            <pc:sldMk cId="1699194054" sldId="256"/>
-            <ac:spMk id="61" creationId="{0FB35778-F1A7-A1E5-814A-D7DD8A4927F0}"/>
-          </ac:spMkLst>
-        </pc:spChg>
-        <pc:spChg chg="add mod">
-          <ac:chgData name="UCHIYAMA Yuusuke" userId="758e3d5f-3bbb-4028-bd3a-66c5ef996226" providerId="ADAL" clId="{22A1A70B-2FAB-44C9-9F8F-ADEC70ED84E9}" dt="2024-12-27T05:38:31.983" v="538" actId="1076"/>
-          <ac:spMkLst>
-            <pc:docMk/>
-            <pc:sldMk cId="1699194054" sldId="256"/>
-            <ac:spMk id="62" creationId="{E7A13E6F-66C5-65B0-8613-C4B5459ECD66}"/>
-          </ac:spMkLst>
-        </pc:spChg>
-        <pc:spChg chg="add mod">
-          <ac:chgData name="UCHIYAMA Yuusuke" userId="758e3d5f-3bbb-4028-bd3a-66c5ef996226" providerId="ADAL" clId="{22A1A70B-2FAB-44C9-9F8F-ADEC70ED84E9}" dt="2024-12-27T05:39:18.631" v="545" actId="1076"/>
-          <ac:spMkLst>
-            <pc:docMk/>
-            <pc:sldMk cId="1699194054" sldId="256"/>
-            <ac:spMk id="66" creationId="{E68BEDA9-7359-31D9-7DDD-DF54B3A2FEB6}"/>
-          </ac:spMkLst>
-        </pc:spChg>
-        <pc:spChg chg="add mod">
-          <ac:chgData name="UCHIYAMA Yuusuke" userId="758e3d5f-3bbb-4028-bd3a-66c5ef996226" providerId="ADAL" clId="{22A1A70B-2FAB-44C9-9F8F-ADEC70ED84E9}" dt="2024-12-27T05:55:53.746" v="557" actId="20577"/>
-          <ac:spMkLst>
-            <pc:docMk/>
-            <pc:sldMk cId="1699194054" sldId="256"/>
-            <ac:spMk id="67" creationId="{BE8A343F-C032-3E9D-2FFA-B53043BCF3C1}"/>
-          </ac:spMkLst>
-        </pc:spChg>
-        <pc:grpChg chg="del">
-          <ac:chgData name="UCHIYAMA Yuusuke" userId="758e3d5f-3bbb-4028-bd3a-66c5ef996226" providerId="ADAL" clId="{22A1A70B-2FAB-44C9-9F8F-ADEC70ED84E9}" dt="2024-12-27T05:12:12.838" v="0" actId="165"/>
-          <ac:grpSpMkLst>
-            <pc:docMk/>
-            <pc:sldMk cId="1699194054" sldId="256"/>
-            <ac:grpSpMk id="33" creationId="{B8A7220A-76CA-53D9-C300-21907B12C0BC}"/>
-          </ac:grpSpMkLst>
-        </pc:grpChg>
-        <pc:grpChg chg="add mod">
-          <ac:chgData name="UCHIYAMA Yuusuke" userId="758e3d5f-3bbb-4028-bd3a-66c5ef996226" providerId="ADAL" clId="{22A1A70B-2FAB-44C9-9F8F-ADEC70ED84E9}" dt="2024-12-27T05:38:31.983" v="538" actId="1076"/>
-          <ac:grpSpMkLst>
-            <pc:docMk/>
-            <pc:sldMk cId="1699194054" sldId="256"/>
-            <ac:grpSpMk id="34" creationId="{E90C55D3-B18F-F796-F316-95634194B04D}"/>
-          </ac:grpSpMkLst>
-        </pc:grpChg>
-        <pc:grpChg chg="add mod ord">
-          <ac:chgData name="UCHIYAMA Yuusuke" userId="758e3d5f-3bbb-4028-bd3a-66c5ef996226" providerId="ADAL" clId="{22A1A70B-2FAB-44C9-9F8F-ADEC70ED84E9}" dt="2024-12-27T05:38:31.983" v="538" actId="1076"/>
-          <ac:grpSpMkLst>
-            <pc:docMk/>
-            <pc:sldMk cId="1699194054" sldId="256"/>
-            <ac:grpSpMk id="52" creationId="{0CB1CFFC-03D2-7324-1A73-6FA69E963BF6}"/>
-          </ac:grpSpMkLst>
-        </pc:grpChg>
-        <pc:picChg chg="del mod topLvl">
-          <ac:chgData name="UCHIYAMA Yuusuke" userId="758e3d5f-3bbb-4028-bd3a-66c5ef996226" providerId="ADAL" clId="{22A1A70B-2FAB-44C9-9F8F-ADEC70ED84E9}" dt="2024-12-27T05:12:18.917" v="1" actId="21"/>
-          <ac:picMkLst>
-            <pc:docMk/>
-            <pc:sldMk cId="1699194054" sldId="256"/>
-            <ac:picMk id="4" creationId="{C1ACA347-AA49-207C-D228-294314E2D43E}"/>
-          </ac:picMkLst>
-        </pc:picChg>
-        <pc:picChg chg="add mod ord modCrop">
-          <ac:chgData name="UCHIYAMA Yuusuke" userId="758e3d5f-3bbb-4028-bd3a-66c5ef996226" providerId="ADAL" clId="{22A1A70B-2FAB-44C9-9F8F-ADEC70ED84E9}" dt="2024-12-27T05:55:28.108" v="556" actId="732"/>
-          <ac:picMkLst>
-            <pc:docMk/>
-            <pc:sldMk cId="1699194054" sldId="256"/>
-            <ac:picMk id="6" creationId="{4261D5B3-C2FE-E179-2B3A-D92CEB4F1926}"/>
-          </ac:picMkLst>
-        </pc:picChg>
-        <pc:picChg chg="del mod topLvl">
-          <ac:chgData name="UCHIYAMA Yuusuke" userId="758e3d5f-3bbb-4028-bd3a-66c5ef996226" providerId="ADAL" clId="{22A1A70B-2FAB-44C9-9F8F-ADEC70ED84E9}" dt="2024-12-27T05:12:18.917" v="1" actId="21"/>
-          <ac:picMkLst>
-            <pc:docMk/>
-            <pc:sldMk cId="1699194054" sldId="256"/>
-            <ac:picMk id="10" creationId="{E590D526-F766-6A85-3CC5-089DB325534E}"/>
-          </ac:picMkLst>
-        </pc:picChg>
-        <pc:picChg chg="del mod topLvl">
-          <ac:chgData name="UCHIYAMA Yuusuke" userId="758e3d5f-3bbb-4028-bd3a-66c5ef996226" providerId="ADAL" clId="{22A1A70B-2FAB-44C9-9F8F-ADEC70ED84E9}" dt="2024-12-27T05:12:22.729" v="3" actId="21"/>
-          <ac:picMkLst>
-            <pc:docMk/>
-            <pc:sldMk cId="1699194054" sldId="256"/>
-            <ac:picMk id="19" creationId="{3C1E40E8-2917-CCCA-9A3F-631850FFD5C7}"/>
-          </ac:picMkLst>
-        </pc:picChg>
-        <pc:cxnChg chg="del mod topLvl">
-          <ac:chgData name="UCHIYAMA Yuusuke" userId="758e3d5f-3bbb-4028-bd3a-66c5ef996226" providerId="ADAL" clId="{22A1A70B-2FAB-44C9-9F8F-ADEC70ED84E9}" dt="2024-12-27T05:12:18.917" v="1" actId="21"/>
-          <ac:cxnSpMkLst>
-            <pc:docMk/>
-            <pc:sldMk cId="1699194054" sldId="256"/>
-            <ac:cxnSpMk id="9" creationId="{0CDBC5A6-3033-FFEB-9CDF-03193A3E796F}"/>
-          </ac:cxnSpMkLst>
-        </pc:cxnChg>
-        <pc:cxnChg chg="del mod topLvl">
-          <ac:chgData name="UCHIYAMA Yuusuke" userId="758e3d5f-3bbb-4028-bd3a-66c5ef996226" providerId="ADAL" clId="{22A1A70B-2FAB-44C9-9F8F-ADEC70ED84E9}" dt="2024-12-27T05:12:18.917" v="1" actId="21"/>
-          <ac:cxnSpMkLst>
-            <pc:docMk/>
-            <pc:sldMk cId="1699194054" sldId="256"/>
-            <ac:cxnSpMk id="15" creationId="{F71E677F-BB3A-EB09-01E9-4DCFC6C77968}"/>
-          </ac:cxnSpMkLst>
-        </pc:cxnChg>
-        <pc:cxnChg chg="del mod topLvl">
-          <ac:chgData name="UCHIYAMA Yuusuke" userId="758e3d5f-3bbb-4028-bd3a-66c5ef996226" providerId="ADAL" clId="{22A1A70B-2FAB-44C9-9F8F-ADEC70ED84E9}" dt="2024-12-27T05:12:18.917" v="1" actId="21"/>
-          <ac:cxnSpMkLst>
-            <pc:docMk/>
-            <pc:sldMk cId="1699194054" sldId="256"/>
-            <ac:cxnSpMk id="18" creationId="{9E2FE375-C406-6A02-A105-8211DA05AC06}"/>
-          </ac:cxnSpMkLst>
-        </pc:cxnChg>
-        <pc:cxnChg chg="mod topLvl">
-          <ac:chgData name="UCHIYAMA Yuusuke" userId="758e3d5f-3bbb-4028-bd3a-66c5ef996226" providerId="ADAL" clId="{22A1A70B-2FAB-44C9-9F8F-ADEC70ED84E9}" dt="2024-12-27T05:38:14.272" v="537"/>
-          <ac:cxnSpMkLst>
-            <pc:docMk/>
-            <pc:sldMk cId="1699194054" sldId="256"/>
-            <ac:cxnSpMk id="23" creationId="{352E15F8-E38C-5BBD-039D-347E0C0EFE22}"/>
-          </ac:cxnSpMkLst>
-        </pc:cxnChg>
-        <pc:cxnChg chg="mod topLvl">
-          <ac:chgData name="UCHIYAMA Yuusuke" userId="758e3d5f-3bbb-4028-bd3a-66c5ef996226" providerId="ADAL" clId="{22A1A70B-2FAB-44C9-9F8F-ADEC70ED84E9}" dt="2024-12-27T05:39:53.754" v="550" actId="14100"/>
-          <ac:cxnSpMkLst>
-            <pc:docMk/>
-            <pc:sldMk cId="1699194054" sldId="256"/>
-            <ac:cxnSpMk id="26" creationId="{FD92AFA0-40AE-D4BF-C268-9D15A6C72E3F}"/>
-          </ac:cxnSpMkLst>
-        </pc:cxnChg>
-        <pc:cxnChg chg="mod topLvl">
-          <ac:chgData name="UCHIYAMA Yuusuke" userId="758e3d5f-3bbb-4028-bd3a-66c5ef996226" providerId="ADAL" clId="{22A1A70B-2FAB-44C9-9F8F-ADEC70ED84E9}" dt="2024-12-27T05:38:31.983" v="538" actId="1076"/>
-          <ac:cxnSpMkLst>
-            <pc:docMk/>
-            <pc:sldMk cId="1699194054" sldId="256"/>
-            <ac:cxnSpMk id="27" creationId="{1E0148C8-29A8-F30E-071A-0B262CA63EB8}"/>
-          </ac:cxnSpMkLst>
-        </pc:cxnChg>
-        <pc:cxnChg chg="add mod">
-          <ac:chgData name="UCHIYAMA Yuusuke" userId="758e3d5f-3bbb-4028-bd3a-66c5ef996226" providerId="ADAL" clId="{22A1A70B-2FAB-44C9-9F8F-ADEC70ED84E9}" dt="2024-12-27T05:38:31.983" v="538" actId="1076"/>
-          <ac:cxnSpMkLst>
-            <pc:docMk/>
-            <pc:sldMk cId="1699194054" sldId="256"/>
-            <ac:cxnSpMk id="42" creationId="{D5C2F3D6-A061-D603-80CB-12C90D8829E0}"/>
-          </ac:cxnSpMkLst>
-        </pc:cxnChg>
-        <pc:cxnChg chg="add mod">
-          <ac:chgData name="UCHIYAMA Yuusuke" userId="758e3d5f-3bbb-4028-bd3a-66c5ef996226" providerId="ADAL" clId="{22A1A70B-2FAB-44C9-9F8F-ADEC70ED84E9}" dt="2024-12-27T05:48:43.763" v="552" actId="692"/>
-          <ac:cxnSpMkLst>
-            <pc:docMk/>
-            <pc:sldMk cId="1699194054" sldId="256"/>
-            <ac:cxnSpMk id="47" creationId="{51849CA3-1087-3254-259B-DCECF2C0FF26}"/>
-          </ac:cxnSpMkLst>
-        </pc:cxnChg>
-        <pc:cxnChg chg="add mod">
-          <ac:chgData name="UCHIYAMA Yuusuke" userId="758e3d5f-3bbb-4028-bd3a-66c5ef996226" providerId="ADAL" clId="{22A1A70B-2FAB-44C9-9F8F-ADEC70ED84E9}" dt="2024-12-27T05:39:27.202" v="548" actId="14100"/>
-          <ac:cxnSpMkLst>
-            <pc:docMk/>
-            <pc:sldMk cId="1699194054" sldId="256"/>
-            <ac:cxnSpMk id="64" creationId="{0CCECB52-0D2D-FE1B-C09B-D0FF6A963CB2}"/>
-          </ac:cxnSpMkLst>
-        </pc:cxnChg>
       </pc:sldChg>
-      <pc:sldMasterChg chg="modSp modSldLayout">
-        <pc:chgData name="UCHIYAMA Yuusuke" userId="758e3d5f-3bbb-4028-bd3a-66c5ef996226" providerId="ADAL" clId="{22A1A70B-2FAB-44C9-9F8F-ADEC70ED84E9}" dt="2024-12-27T05:38:14.272" v="537"/>
-        <pc:sldMasterMkLst>
-          <pc:docMk/>
-          <pc:sldMasterMk cId="3013802324" sldId="2147483708"/>
-        </pc:sldMasterMkLst>
-        <pc:spChg chg="mod">
-          <ac:chgData name="UCHIYAMA Yuusuke" userId="758e3d5f-3bbb-4028-bd3a-66c5ef996226" providerId="ADAL" clId="{22A1A70B-2FAB-44C9-9F8F-ADEC70ED84E9}" dt="2024-12-27T05:38:14.272" v="537"/>
-          <ac:spMkLst>
-            <pc:docMk/>
-            <pc:sldMasterMk cId="3013802324" sldId="2147483708"/>
-            <ac:spMk id="2" creationId="{00000000-0000-0000-0000-000000000000}"/>
-          </ac:spMkLst>
-        </pc:spChg>
-        <pc:spChg chg="mod">
-          <ac:chgData name="UCHIYAMA Yuusuke" userId="758e3d5f-3bbb-4028-bd3a-66c5ef996226" providerId="ADAL" clId="{22A1A70B-2FAB-44C9-9F8F-ADEC70ED84E9}" dt="2024-12-27T05:38:14.272" v="537"/>
-          <ac:spMkLst>
-            <pc:docMk/>
-            <pc:sldMasterMk cId="3013802324" sldId="2147483708"/>
-            <ac:spMk id="3" creationId="{00000000-0000-0000-0000-000000000000}"/>
-          </ac:spMkLst>
-        </pc:spChg>
-        <pc:spChg chg="mod">
-          <ac:chgData name="UCHIYAMA Yuusuke" userId="758e3d5f-3bbb-4028-bd3a-66c5ef996226" providerId="ADAL" clId="{22A1A70B-2FAB-44C9-9F8F-ADEC70ED84E9}" dt="2024-12-27T05:38:14.272" v="537"/>
-          <ac:spMkLst>
-            <pc:docMk/>
-            <pc:sldMasterMk cId="3013802324" sldId="2147483708"/>
-            <ac:spMk id="4" creationId="{00000000-0000-0000-0000-000000000000}"/>
-          </ac:spMkLst>
-        </pc:spChg>
-        <pc:spChg chg="mod">
-          <ac:chgData name="UCHIYAMA Yuusuke" userId="758e3d5f-3bbb-4028-bd3a-66c5ef996226" providerId="ADAL" clId="{22A1A70B-2FAB-44C9-9F8F-ADEC70ED84E9}" dt="2024-12-27T05:38:14.272" v="537"/>
-          <ac:spMkLst>
-            <pc:docMk/>
-            <pc:sldMasterMk cId="3013802324" sldId="2147483708"/>
-            <ac:spMk id="5" creationId="{00000000-0000-0000-0000-000000000000}"/>
-          </ac:spMkLst>
-        </pc:spChg>
-        <pc:spChg chg="mod">
-          <ac:chgData name="UCHIYAMA Yuusuke" userId="758e3d5f-3bbb-4028-bd3a-66c5ef996226" providerId="ADAL" clId="{22A1A70B-2FAB-44C9-9F8F-ADEC70ED84E9}" dt="2024-12-27T05:38:14.272" v="537"/>
-          <ac:spMkLst>
-            <pc:docMk/>
-            <pc:sldMasterMk cId="3013802324" sldId="2147483708"/>
-            <ac:spMk id="6" creationId="{00000000-0000-0000-0000-000000000000}"/>
-          </ac:spMkLst>
-        </pc:spChg>
-        <pc:sldLayoutChg chg="modSp">
-          <pc:chgData name="UCHIYAMA Yuusuke" userId="758e3d5f-3bbb-4028-bd3a-66c5ef996226" providerId="ADAL" clId="{22A1A70B-2FAB-44C9-9F8F-ADEC70ED84E9}" dt="2024-12-27T05:38:14.272" v="537"/>
-          <pc:sldLayoutMkLst>
-            <pc:docMk/>
-            <pc:sldMasterMk cId="3013802324" sldId="2147483708"/>
-            <pc:sldLayoutMk cId="258686050" sldId="2147483709"/>
-          </pc:sldLayoutMkLst>
-          <pc:spChg chg="mod">
-            <ac:chgData name="UCHIYAMA Yuusuke" userId="758e3d5f-3bbb-4028-bd3a-66c5ef996226" providerId="ADAL" clId="{22A1A70B-2FAB-44C9-9F8F-ADEC70ED84E9}" dt="2024-12-27T05:38:14.272" v="537"/>
-            <ac:spMkLst>
-              <pc:docMk/>
-              <pc:sldMasterMk cId="3013802324" sldId="2147483708"/>
-              <pc:sldLayoutMk cId="258686050" sldId="2147483709"/>
-              <ac:spMk id="2" creationId="{00000000-0000-0000-0000-000000000000}"/>
-            </ac:spMkLst>
-          </pc:spChg>
-          <pc:spChg chg="mod">
-            <ac:chgData name="UCHIYAMA Yuusuke" userId="758e3d5f-3bbb-4028-bd3a-66c5ef996226" providerId="ADAL" clId="{22A1A70B-2FAB-44C9-9F8F-ADEC70ED84E9}" dt="2024-12-27T05:38:14.272" v="537"/>
-            <ac:spMkLst>
-              <pc:docMk/>
-              <pc:sldMasterMk cId="3013802324" sldId="2147483708"/>
-              <pc:sldLayoutMk cId="258686050" sldId="2147483709"/>
-              <ac:spMk id="3" creationId="{00000000-0000-0000-0000-000000000000}"/>
-            </ac:spMkLst>
-          </pc:spChg>
-        </pc:sldLayoutChg>
-        <pc:sldLayoutChg chg="modSp">
-          <pc:chgData name="UCHIYAMA Yuusuke" userId="758e3d5f-3bbb-4028-bd3a-66c5ef996226" providerId="ADAL" clId="{22A1A70B-2FAB-44C9-9F8F-ADEC70ED84E9}" dt="2024-12-27T05:38:14.272" v="537"/>
-          <pc:sldLayoutMkLst>
-            <pc:docMk/>
-            <pc:sldMasterMk cId="3013802324" sldId="2147483708"/>
-            <pc:sldLayoutMk cId="385739048" sldId="2147483711"/>
-          </pc:sldLayoutMkLst>
-          <pc:spChg chg="mod">
-            <ac:chgData name="UCHIYAMA Yuusuke" userId="758e3d5f-3bbb-4028-bd3a-66c5ef996226" providerId="ADAL" clId="{22A1A70B-2FAB-44C9-9F8F-ADEC70ED84E9}" dt="2024-12-27T05:38:14.272" v="537"/>
-            <ac:spMkLst>
-              <pc:docMk/>
-              <pc:sldMasterMk cId="3013802324" sldId="2147483708"/>
-              <pc:sldLayoutMk cId="385739048" sldId="2147483711"/>
-              <ac:spMk id="2" creationId="{00000000-0000-0000-0000-000000000000}"/>
-            </ac:spMkLst>
-          </pc:spChg>
-          <pc:spChg chg="mod">
-            <ac:chgData name="UCHIYAMA Yuusuke" userId="758e3d5f-3bbb-4028-bd3a-66c5ef996226" providerId="ADAL" clId="{22A1A70B-2FAB-44C9-9F8F-ADEC70ED84E9}" dt="2024-12-27T05:38:14.272" v="537"/>
-            <ac:spMkLst>
-              <pc:docMk/>
-              <pc:sldMasterMk cId="3013802324" sldId="2147483708"/>
-              <pc:sldLayoutMk cId="385739048" sldId="2147483711"/>
-              <ac:spMk id="3" creationId="{00000000-0000-0000-0000-000000000000}"/>
-            </ac:spMkLst>
-          </pc:spChg>
-        </pc:sldLayoutChg>
-        <pc:sldLayoutChg chg="modSp">
-          <pc:chgData name="UCHIYAMA Yuusuke" userId="758e3d5f-3bbb-4028-bd3a-66c5ef996226" providerId="ADAL" clId="{22A1A70B-2FAB-44C9-9F8F-ADEC70ED84E9}" dt="2024-12-27T05:38:14.272" v="537"/>
-          <pc:sldLayoutMkLst>
-            <pc:docMk/>
-            <pc:sldMasterMk cId="3013802324" sldId="2147483708"/>
-            <pc:sldLayoutMk cId="1889098297" sldId="2147483712"/>
-          </pc:sldLayoutMkLst>
-          <pc:spChg chg="mod">
-            <ac:chgData name="UCHIYAMA Yuusuke" userId="758e3d5f-3bbb-4028-bd3a-66c5ef996226" providerId="ADAL" clId="{22A1A70B-2FAB-44C9-9F8F-ADEC70ED84E9}" dt="2024-12-27T05:38:14.272" v="537"/>
-            <ac:spMkLst>
-              <pc:docMk/>
-              <pc:sldMasterMk cId="3013802324" sldId="2147483708"/>
-              <pc:sldLayoutMk cId="1889098297" sldId="2147483712"/>
-              <ac:spMk id="3" creationId="{00000000-0000-0000-0000-000000000000}"/>
-            </ac:spMkLst>
-          </pc:spChg>
-          <pc:spChg chg="mod">
-            <ac:chgData name="UCHIYAMA Yuusuke" userId="758e3d5f-3bbb-4028-bd3a-66c5ef996226" providerId="ADAL" clId="{22A1A70B-2FAB-44C9-9F8F-ADEC70ED84E9}" dt="2024-12-27T05:38:14.272" v="537"/>
-            <ac:spMkLst>
-              <pc:docMk/>
-              <pc:sldMasterMk cId="3013802324" sldId="2147483708"/>
-              <pc:sldLayoutMk cId="1889098297" sldId="2147483712"/>
-              <ac:spMk id="4" creationId="{00000000-0000-0000-0000-000000000000}"/>
-            </ac:spMkLst>
-          </pc:spChg>
-        </pc:sldLayoutChg>
-        <pc:sldLayoutChg chg="modSp">
-          <pc:chgData name="UCHIYAMA Yuusuke" userId="758e3d5f-3bbb-4028-bd3a-66c5ef996226" providerId="ADAL" clId="{22A1A70B-2FAB-44C9-9F8F-ADEC70ED84E9}" dt="2024-12-27T05:38:14.272" v="537"/>
-          <pc:sldLayoutMkLst>
-            <pc:docMk/>
-            <pc:sldMasterMk cId="3013802324" sldId="2147483708"/>
-            <pc:sldLayoutMk cId="4265835733" sldId="2147483713"/>
-          </pc:sldLayoutMkLst>
-          <pc:spChg chg="mod">
-            <ac:chgData name="UCHIYAMA Yuusuke" userId="758e3d5f-3bbb-4028-bd3a-66c5ef996226" providerId="ADAL" clId="{22A1A70B-2FAB-44C9-9F8F-ADEC70ED84E9}" dt="2024-12-27T05:38:14.272" v="537"/>
-            <ac:spMkLst>
-              <pc:docMk/>
-              <pc:sldMasterMk cId="3013802324" sldId="2147483708"/>
-              <pc:sldLayoutMk cId="4265835733" sldId="2147483713"/>
-              <ac:spMk id="2" creationId="{00000000-0000-0000-0000-000000000000}"/>
-            </ac:spMkLst>
-          </pc:spChg>
-          <pc:spChg chg="mod">
-            <ac:chgData name="UCHIYAMA Yuusuke" userId="758e3d5f-3bbb-4028-bd3a-66c5ef996226" providerId="ADAL" clId="{22A1A70B-2FAB-44C9-9F8F-ADEC70ED84E9}" dt="2024-12-27T05:38:14.272" v="537"/>
-            <ac:spMkLst>
-              <pc:docMk/>
-              <pc:sldMasterMk cId="3013802324" sldId="2147483708"/>
-              <pc:sldLayoutMk cId="4265835733" sldId="2147483713"/>
-              <ac:spMk id="3" creationId="{00000000-0000-0000-0000-000000000000}"/>
-            </ac:spMkLst>
-          </pc:spChg>
-          <pc:spChg chg="mod">
-            <ac:chgData name="UCHIYAMA Yuusuke" userId="758e3d5f-3bbb-4028-bd3a-66c5ef996226" providerId="ADAL" clId="{22A1A70B-2FAB-44C9-9F8F-ADEC70ED84E9}" dt="2024-12-27T05:38:14.272" v="537"/>
-            <ac:spMkLst>
-              <pc:docMk/>
-              <pc:sldMasterMk cId="3013802324" sldId="2147483708"/>
-              <pc:sldLayoutMk cId="4265835733" sldId="2147483713"/>
-              <ac:spMk id="4" creationId="{00000000-0000-0000-0000-000000000000}"/>
-            </ac:spMkLst>
-          </pc:spChg>
-          <pc:spChg chg="mod">
-            <ac:chgData name="UCHIYAMA Yuusuke" userId="758e3d5f-3bbb-4028-bd3a-66c5ef996226" providerId="ADAL" clId="{22A1A70B-2FAB-44C9-9F8F-ADEC70ED84E9}" dt="2024-12-27T05:38:14.272" v="537"/>
-            <ac:spMkLst>
-              <pc:docMk/>
-              <pc:sldMasterMk cId="3013802324" sldId="2147483708"/>
-              <pc:sldLayoutMk cId="4265835733" sldId="2147483713"/>
-              <ac:spMk id="5" creationId="{00000000-0000-0000-0000-000000000000}"/>
-            </ac:spMkLst>
-          </pc:spChg>
-          <pc:spChg chg="mod">
-            <ac:chgData name="UCHIYAMA Yuusuke" userId="758e3d5f-3bbb-4028-bd3a-66c5ef996226" providerId="ADAL" clId="{22A1A70B-2FAB-44C9-9F8F-ADEC70ED84E9}" dt="2024-12-27T05:38:14.272" v="537"/>
-            <ac:spMkLst>
-              <pc:docMk/>
-              <pc:sldMasterMk cId="3013802324" sldId="2147483708"/>
-              <pc:sldLayoutMk cId="4265835733" sldId="2147483713"/>
-              <ac:spMk id="6" creationId="{00000000-0000-0000-0000-000000000000}"/>
-            </ac:spMkLst>
-          </pc:spChg>
-        </pc:sldLayoutChg>
-        <pc:sldLayoutChg chg="modSp">
-          <pc:chgData name="UCHIYAMA Yuusuke" userId="758e3d5f-3bbb-4028-bd3a-66c5ef996226" providerId="ADAL" clId="{22A1A70B-2FAB-44C9-9F8F-ADEC70ED84E9}" dt="2024-12-27T05:38:14.272" v="537"/>
-          <pc:sldLayoutMkLst>
-            <pc:docMk/>
-            <pc:sldMasterMk cId="3013802324" sldId="2147483708"/>
-            <pc:sldLayoutMk cId="1526854671" sldId="2147483716"/>
-          </pc:sldLayoutMkLst>
-          <pc:spChg chg="mod">
-            <ac:chgData name="UCHIYAMA Yuusuke" userId="758e3d5f-3bbb-4028-bd3a-66c5ef996226" providerId="ADAL" clId="{22A1A70B-2FAB-44C9-9F8F-ADEC70ED84E9}" dt="2024-12-27T05:38:14.272" v="537"/>
-            <ac:spMkLst>
-              <pc:docMk/>
-              <pc:sldMasterMk cId="3013802324" sldId="2147483708"/>
-              <pc:sldLayoutMk cId="1526854671" sldId="2147483716"/>
-              <ac:spMk id="2" creationId="{00000000-0000-0000-0000-000000000000}"/>
-            </ac:spMkLst>
-          </pc:spChg>
-          <pc:spChg chg="mod">
-            <ac:chgData name="UCHIYAMA Yuusuke" userId="758e3d5f-3bbb-4028-bd3a-66c5ef996226" providerId="ADAL" clId="{22A1A70B-2FAB-44C9-9F8F-ADEC70ED84E9}" dt="2024-12-27T05:38:14.272" v="537"/>
-            <ac:spMkLst>
-              <pc:docMk/>
-              <pc:sldMasterMk cId="3013802324" sldId="2147483708"/>
-              <pc:sldLayoutMk cId="1526854671" sldId="2147483716"/>
-              <ac:spMk id="3" creationId="{00000000-0000-0000-0000-000000000000}"/>
-            </ac:spMkLst>
-          </pc:spChg>
-          <pc:spChg chg="mod">
-            <ac:chgData name="UCHIYAMA Yuusuke" userId="758e3d5f-3bbb-4028-bd3a-66c5ef996226" providerId="ADAL" clId="{22A1A70B-2FAB-44C9-9F8F-ADEC70ED84E9}" dt="2024-12-27T05:38:14.272" v="537"/>
-            <ac:spMkLst>
-              <pc:docMk/>
-              <pc:sldMasterMk cId="3013802324" sldId="2147483708"/>
-              <pc:sldLayoutMk cId="1526854671" sldId="2147483716"/>
-              <ac:spMk id="4" creationId="{00000000-0000-0000-0000-000000000000}"/>
-            </ac:spMkLst>
-          </pc:spChg>
-        </pc:sldLayoutChg>
-        <pc:sldLayoutChg chg="modSp">
-          <pc:chgData name="UCHIYAMA Yuusuke" userId="758e3d5f-3bbb-4028-bd3a-66c5ef996226" providerId="ADAL" clId="{22A1A70B-2FAB-44C9-9F8F-ADEC70ED84E9}" dt="2024-12-27T05:38:14.272" v="537"/>
-          <pc:sldLayoutMkLst>
-            <pc:docMk/>
-            <pc:sldMasterMk cId="3013802324" sldId="2147483708"/>
-            <pc:sldLayoutMk cId="3542660327" sldId="2147483717"/>
-          </pc:sldLayoutMkLst>
-          <pc:spChg chg="mod">
-            <ac:chgData name="UCHIYAMA Yuusuke" userId="758e3d5f-3bbb-4028-bd3a-66c5ef996226" providerId="ADAL" clId="{22A1A70B-2FAB-44C9-9F8F-ADEC70ED84E9}" dt="2024-12-27T05:38:14.272" v="537"/>
-            <ac:spMkLst>
-              <pc:docMk/>
-              <pc:sldMasterMk cId="3013802324" sldId="2147483708"/>
-              <pc:sldLayoutMk cId="3542660327" sldId="2147483717"/>
-              <ac:spMk id="2" creationId="{00000000-0000-0000-0000-000000000000}"/>
-            </ac:spMkLst>
-          </pc:spChg>
-          <pc:spChg chg="mod">
-            <ac:chgData name="UCHIYAMA Yuusuke" userId="758e3d5f-3bbb-4028-bd3a-66c5ef996226" providerId="ADAL" clId="{22A1A70B-2FAB-44C9-9F8F-ADEC70ED84E9}" dt="2024-12-27T05:38:14.272" v="537"/>
-            <ac:spMkLst>
-              <pc:docMk/>
-              <pc:sldMasterMk cId="3013802324" sldId="2147483708"/>
-              <pc:sldLayoutMk cId="3542660327" sldId="2147483717"/>
-              <ac:spMk id="3" creationId="{00000000-0000-0000-0000-000000000000}"/>
-            </ac:spMkLst>
-          </pc:spChg>
-          <pc:spChg chg="mod">
-            <ac:chgData name="UCHIYAMA Yuusuke" userId="758e3d5f-3bbb-4028-bd3a-66c5ef996226" providerId="ADAL" clId="{22A1A70B-2FAB-44C9-9F8F-ADEC70ED84E9}" dt="2024-12-27T05:38:14.272" v="537"/>
-            <ac:spMkLst>
-              <pc:docMk/>
-              <pc:sldMasterMk cId="3013802324" sldId="2147483708"/>
-              <pc:sldLayoutMk cId="3542660327" sldId="2147483717"/>
-              <ac:spMk id="4" creationId="{00000000-0000-0000-0000-000000000000}"/>
-            </ac:spMkLst>
-          </pc:spChg>
-        </pc:sldLayoutChg>
-        <pc:sldLayoutChg chg="modSp">
-          <pc:chgData name="UCHIYAMA Yuusuke" userId="758e3d5f-3bbb-4028-bd3a-66c5ef996226" providerId="ADAL" clId="{22A1A70B-2FAB-44C9-9F8F-ADEC70ED84E9}" dt="2024-12-27T05:38:14.272" v="537"/>
-          <pc:sldLayoutMkLst>
-            <pc:docMk/>
-            <pc:sldMasterMk cId="3013802324" sldId="2147483708"/>
-            <pc:sldLayoutMk cId="1830554282" sldId="2147483719"/>
-          </pc:sldLayoutMkLst>
-          <pc:spChg chg="mod">
-            <ac:chgData name="UCHIYAMA Yuusuke" userId="758e3d5f-3bbb-4028-bd3a-66c5ef996226" providerId="ADAL" clId="{22A1A70B-2FAB-44C9-9F8F-ADEC70ED84E9}" dt="2024-12-27T05:38:14.272" v="537"/>
-            <ac:spMkLst>
-              <pc:docMk/>
-              <pc:sldMasterMk cId="3013802324" sldId="2147483708"/>
-              <pc:sldLayoutMk cId="1830554282" sldId="2147483719"/>
-              <ac:spMk id="2" creationId="{00000000-0000-0000-0000-000000000000}"/>
-            </ac:spMkLst>
-          </pc:spChg>
-          <pc:spChg chg="mod">
-            <ac:chgData name="UCHIYAMA Yuusuke" userId="758e3d5f-3bbb-4028-bd3a-66c5ef996226" providerId="ADAL" clId="{22A1A70B-2FAB-44C9-9F8F-ADEC70ED84E9}" dt="2024-12-27T05:38:14.272" v="537"/>
-            <ac:spMkLst>
-              <pc:docMk/>
-              <pc:sldMasterMk cId="3013802324" sldId="2147483708"/>
-              <pc:sldLayoutMk cId="1830554282" sldId="2147483719"/>
-              <ac:spMk id="3" creationId="{00000000-0000-0000-0000-000000000000}"/>
-            </ac:spMkLst>
-          </pc:spChg>
-        </pc:sldLayoutChg>
-      </pc:sldMasterChg>
     </pc:docChg>
   </pc:docChgLst>
 </pc:chgInfo>
@@ -890,7 +280,7 @@
           <a:p>
             <a:fld id="{8E9986EE-3F7C-4D3D-BBD8-750034447C60}" type="datetimeFigureOut">
               <a:rPr kumimoji="1" lang="ja-JP" altLang="en-US" smtClean="0"/>
-              <a:t>2024/12/27</a:t>
+              <a:t>2025/12/10</a:t>
             </a:fld>
             <a:endParaRPr kumimoji="1" lang="ja-JP" altLang="en-US"/>
           </a:p>
@@ -1092,7 +482,7 @@
           <a:p>
             <a:fld id="{8E9986EE-3F7C-4D3D-BBD8-750034447C60}" type="datetimeFigureOut">
               <a:rPr kumimoji="1" lang="ja-JP" altLang="en-US" smtClean="0"/>
-              <a:t>2024/12/27</a:t>
+              <a:t>2025/12/10</a:t>
             </a:fld>
             <a:endParaRPr kumimoji="1" lang="ja-JP" altLang="en-US"/>
           </a:p>
@@ -1304,7 +694,7 @@
           <a:p>
             <a:fld id="{8E9986EE-3F7C-4D3D-BBD8-750034447C60}" type="datetimeFigureOut">
               <a:rPr kumimoji="1" lang="ja-JP" altLang="en-US" smtClean="0"/>
-              <a:t>2024/12/27</a:t>
+              <a:t>2025/12/10</a:t>
             </a:fld>
             <a:endParaRPr kumimoji="1" lang="ja-JP" altLang="en-US"/>
           </a:p>
@@ -1506,7 +896,7 @@
           <a:p>
             <a:fld id="{8E9986EE-3F7C-4D3D-BBD8-750034447C60}" type="datetimeFigureOut">
               <a:rPr kumimoji="1" lang="ja-JP" altLang="en-US" smtClean="0"/>
-              <a:t>2024/12/27</a:t>
+              <a:t>2025/12/10</a:t>
             </a:fld>
             <a:endParaRPr kumimoji="1" lang="ja-JP" altLang="en-US"/>
           </a:p>
@@ -1752,7 +1142,7 @@
           <a:p>
             <a:fld id="{8E9986EE-3F7C-4D3D-BBD8-750034447C60}" type="datetimeFigureOut">
               <a:rPr kumimoji="1" lang="ja-JP" altLang="en-US" smtClean="0"/>
-              <a:t>2024/12/27</a:t>
+              <a:t>2025/12/10</a:t>
             </a:fld>
             <a:endParaRPr kumimoji="1" lang="ja-JP" altLang="en-US"/>
           </a:p>
@@ -2048,7 +1438,7 @@
           <a:p>
             <a:fld id="{8E9986EE-3F7C-4D3D-BBD8-750034447C60}" type="datetimeFigureOut">
               <a:rPr kumimoji="1" lang="ja-JP" altLang="en-US" smtClean="0"/>
-              <a:t>2024/12/27</a:t>
+              <a:t>2025/12/10</a:t>
             </a:fld>
             <a:endParaRPr kumimoji="1" lang="ja-JP" altLang="en-US"/>
           </a:p>
@@ -2479,7 +1869,7 @@
           <a:p>
             <a:fld id="{8E9986EE-3F7C-4D3D-BBD8-750034447C60}" type="datetimeFigureOut">
               <a:rPr kumimoji="1" lang="ja-JP" altLang="en-US" smtClean="0"/>
-              <a:t>2024/12/27</a:t>
+              <a:t>2025/12/10</a:t>
             </a:fld>
             <a:endParaRPr kumimoji="1" lang="ja-JP" altLang="en-US"/>
           </a:p>
@@ -2597,7 +1987,7 @@
           <a:p>
             <a:fld id="{8E9986EE-3F7C-4D3D-BBD8-750034447C60}" type="datetimeFigureOut">
               <a:rPr kumimoji="1" lang="ja-JP" altLang="en-US" smtClean="0"/>
-              <a:t>2024/12/27</a:t>
+              <a:t>2025/12/10</a:t>
             </a:fld>
             <a:endParaRPr kumimoji="1" lang="ja-JP" altLang="en-US"/>
           </a:p>
@@ -2692,7 +2082,7 @@
           <a:p>
             <a:fld id="{8E9986EE-3F7C-4D3D-BBD8-750034447C60}" type="datetimeFigureOut">
               <a:rPr kumimoji="1" lang="ja-JP" altLang="en-US" smtClean="0"/>
-              <a:t>2024/12/27</a:t>
+              <a:t>2025/12/10</a:t>
             </a:fld>
             <a:endParaRPr kumimoji="1" lang="ja-JP" altLang="en-US"/>
           </a:p>
@@ -3001,7 +2391,7 @@
           <a:p>
             <a:fld id="{8E9986EE-3F7C-4D3D-BBD8-750034447C60}" type="datetimeFigureOut">
               <a:rPr kumimoji="1" lang="ja-JP" altLang="en-US" smtClean="0"/>
-              <a:t>2024/12/27</a:t>
+              <a:t>2025/12/10</a:t>
             </a:fld>
             <a:endParaRPr kumimoji="1" lang="ja-JP" altLang="en-US"/>
           </a:p>
@@ -3258,7 +2648,7 @@
           <a:p>
             <a:fld id="{8E9986EE-3F7C-4D3D-BBD8-750034447C60}" type="datetimeFigureOut">
               <a:rPr kumimoji="1" lang="ja-JP" altLang="en-US" smtClean="0"/>
-              <a:t>2024/12/27</a:t>
+              <a:t>2025/12/10</a:t>
             </a:fld>
             <a:endParaRPr kumimoji="1" lang="ja-JP" altLang="en-US"/>
           </a:p>
@@ -3503,7 +2893,7 @@
           <a:p>
             <a:fld id="{8E9986EE-3F7C-4D3D-BBD8-750034447C60}" type="datetimeFigureOut">
               <a:rPr kumimoji="1" lang="ja-JP" altLang="en-US" smtClean="0"/>
-              <a:t>2024/12/27</a:t>
+              <a:t>2025/12/10</a:t>
             </a:fld>
             <a:endParaRPr kumimoji="1" lang="ja-JP" altLang="en-US"/>
           </a:p>
@@ -4409,16 +3799,20 @@
                   </m:oMath>
                 </a14:m>
                 <a:r>
-                  <a:rPr lang="en-US" altLang="ja-JP" dirty="0"/>
+                  <a:rPr lang="en-US" altLang="ja-JP"/>
                   <a:t>(10</a:t>
                 </a:r>
                 <a:r>
-                  <a:rPr lang="en-US" altLang="ja-JP" baseline="30000" dirty="0"/>
-                  <a:t>-5</a:t>
+                  <a:rPr lang="en-US" altLang="ja-JP" baseline="30000"/>
+                  <a:t>-4</a:t>
+                </a:r>
+                <a:r>
+                  <a:rPr lang="en-US" altLang="ja-JP"/>
+                  <a:t>) </a:t>
                 </a:r>
                 <a:r>
                   <a:rPr lang="en-US" altLang="ja-JP" dirty="0"/>
-                  <a:t>) Pa</a:t>
+                  <a:t>Pa</a:t>
                 </a:r>
               </a:p>
             </p:txBody>

</xml_diff>